<commit_message>
updated charter after 6/15/2020 team meeting
</commit_message>
<xml_diff>
--- a/MDS 561/Project Charter.pptx
+++ b/MDS 561/Project Charter.pptx
@@ -209,6 +209,14 @@
     </p:ext>
   </p:extLst>
 </p:presentation>
+</file>
+
+<file path=ppt/revisionInfo.xml><?xml version="1.0" encoding="utf-8"?>
+<p1510:revInfo xmlns:a="http://schemas.openxmlformats.org/drawingml/2006/main" xmlns:r="http://schemas.openxmlformats.org/officeDocument/2006/relationships" xmlns:p1510="http://schemas.microsoft.com/office/powerpoint/2015/10/main">
+  <p1510:revLst>
+    <p1510:client id="{5B8F07ED-12A4-6D40-97FB-0B56F710D41A}" v="1" dt="2020-06-15T23:06:33.885"/>
+  </p1510:revLst>
+</p1510:revInfo>
 </file>
 
 <file path=ppt/handoutMasters/handoutMaster1.xml><?xml version="1.0" encoding="utf-8"?>
@@ -3822,7 +3830,7 @@
         </p:nvSpPr>
         <p:spPr>
           <a:xfrm>
-            <a:off x="533400" y="1828800"/>
+            <a:off x="573087" y="1956811"/>
             <a:ext cx="7997825" cy="4173538"/>
           </a:xfrm>
           <a:noFill/>
@@ -3832,14 +3840,89 @@
           <a:lstStyle/>
           <a:p>
             <a:r>
-              <a:rPr lang="en-US" altLang="en-US"/>
+              <a:rPr lang="en-US" altLang="en-US" dirty="0"/>
               <a:t>Project Description</a:t>
             </a:r>
           </a:p>
           <a:p>
+            <a:pPr marL="0" indent="0">
+              <a:buNone/>
+            </a:pPr>
             <a:r>
-              <a:rPr lang="en-US" altLang="en-US"/>
+              <a:rPr lang="en-US" altLang="en-US" sz="1800" b="0" dirty="0">
+                <a:cs typeface="Arial"/>
+              </a:rPr>
+              <a:t> - Our team is tasked with assisting (INSERT STATES) in the reopening and recovery process from the COVID-19 pandemic.  We will develop metrics and graphics for risk-assessment and safety guidance.  </a:t>
+            </a:r>
+          </a:p>
+          <a:p>
+            <a:r>
+              <a:rPr lang="en-US" altLang="en-US" dirty="0"/>
               <a:t>Scope</a:t>
+            </a:r>
+            <a:endParaRPr lang="en-US" altLang="en-US" dirty="0">
+              <a:cs typeface="Arial"/>
+            </a:endParaRPr>
+          </a:p>
+          <a:p>
+            <a:pPr marL="0" indent="0">
+              <a:buNone/>
+            </a:pPr>
+            <a:r>
+              <a:rPr lang="en-US" altLang="en-US" sz="1600" b="0" dirty="0">
+                <a:cs typeface="Arial"/>
+              </a:rPr>
+              <a:t>-</a:t>
+            </a:r>
+            <a:r>
+              <a:rPr lang="en-US" altLang="en-US" sz="1600" b="0" dirty="0">
+                <a:ea typeface="+mn-lt"/>
+                <a:cs typeface="+mn-lt"/>
+              </a:rPr>
+              <a:t> Deliverable </a:t>
+            </a:r>
+            <a:r>
+              <a:rPr lang="en-US" sz="1600" b="0" dirty="0">
+                <a:ea typeface="+mn-lt"/>
+                <a:cs typeface="+mn-lt"/>
+              </a:rPr>
+              <a:t>#1—A Touch Screen or Point and Click Fishbone GUI for Local Residents To Predict Personal Risk and Guide Appropriate Mitigations</a:t>
+            </a:r>
+          </a:p>
+          <a:p>
+            <a:pPr marL="0" indent="0">
+              <a:buNone/>
+            </a:pPr>
+            <a:r>
+              <a:rPr lang="en-US" sz="1600" b="0" dirty="0">
+                <a:ea typeface="+mn-lt"/>
+                <a:cs typeface="+mn-lt"/>
+              </a:rPr>
+              <a:t>- Deliverable #2—Tripwire Metric: Weekly Regional Mortality Actual Versus Normal</a:t>
+            </a:r>
+          </a:p>
+          <a:p>
+            <a:pPr marL="0" indent="0">
+              <a:buNone/>
+            </a:pPr>
+            <a:r>
+              <a:rPr lang="en-US" sz="1600" b="0" dirty="0">
+                <a:ea typeface="+mn-lt"/>
+                <a:cs typeface="+mn-lt"/>
+              </a:rPr>
+              <a:t>- Deliverable #3—Tripwire Metric: Forecast of Local Hospital Max Capacity</a:t>
+            </a:r>
+          </a:p>
+          <a:p>
+            <a:pPr marL="0" indent="0">
+              <a:buNone/>
+            </a:pPr>
+            <a:r>
+              <a:rPr lang="en-US" sz="1600" b="0" dirty="0">
+                <a:ea typeface="+mn-lt"/>
+                <a:cs typeface="+mn-lt"/>
+              </a:rPr>
+              <a:t>- Deliverable #4—Community Vulnerability Map in Tableau or Power BI</a:t>
             </a:r>
           </a:p>
         </p:txBody>
@@ -4489,21 +4572,53 @@
           <a:lstStyle/>
           <a:p>
             <a:r>
-              <a:rPr lang="en-US" altLang="en-US"/>
-              <a:t>Business Problem</a:t>
+              <a:rPr lang="en-US" sz="1800" b="0" dirty="0">
+                <a:ea typeface="+mn-lt"/>
+                <a:cs typeface="+mn-lt"/>
+              </a:rPr>
+              <a:t>Open local communities as quickly as possible yet safely</a:t>
             </a:r>
           </a:p>
           <a:p>
             <a:r>
-              <a:rPr lang="en-US" altLang="en-US"/>
-              <a:t>Benefits</a:t>
+              <a:rPr lang="en-US" sz="1800" b="0" dirty="0">
+                <a:ea typeface="+mn-lt"/>
+                <a:cs typeface="+mn-lt"/>
+              </a:rPr>
+              <a:t>Restore businesses back to normal operating levels</a:t>
             </a:r>
           </a:p>
           <a:p>
             <a:r>
-              <a:rPr lang="en-US" altLang="en-US"/>
-              <a:t>Budget</a:t>
+              <a:rPr lang="en-US" sz="1800" b="0" dirty="0">
+                <a:ea typeface="+mn-lt"/>
+                <a:cs typeface="+mn-lt"/>
+              </a:rPr>
+              <a:t>Restore consumer confidence in the safety of local business establishments</a:t>
             </a:r>
+          </a:p>
+          <a:p>
+            <a:r>
+              <a:rPr lang="en-US" sz="1800" b="0" dirty="0">
+                <a:ea typeface="+mn-lt"/>
+                <a:cs typeface="+mn-lt"/>
+              </a:rPr>
+              <a:t>Deploy a risk communication infrastructure at the county level to: 1) aid residents in maintaining hygienic behaviors, 2) inform residents and businesses of emerging risks in their specific geographic areas, and 3) to give guidance to residents in the steps to be taken to avoid risks.  </a:t>
+            </a:r>
+          </a:p>
+          <a:p>
+            <a:r>
+              <a:rPr lang="en-US" sz="1800" b="0" dirty="0">
+                <a:ea typeface="+mn-lt"/>
+                <a:cs typeface="+mn-lt"/>
+              </a:rPr>
+              <a:t>Deploy a set of valid, real time tripwire metrics to provide county and municipal managers with early decision-making guidance for reopening and in responding to future pandemics.  </a:t>
+            </a:r>
+          </a:p>
+          <a:p>
+            <a:endParaRPr lang="en-US" altLang="en-US" sz="2000" dirty="0">
+              <a:cs typeface="Arial"/>
+            </a:endParaRPr>
           </a:p>
         </p:txBody>
       </p:sp>
@@ -4517,7 +4632,7 @@
         </p:nvSpPr>
         <p:spPr bwMode="auto">
           <a:xfrm>
-            <a:off x="381000" y="692150"/>
+            <a:off x="261314" y="614354"/>
             <a:ext cx="8305800" cy="1338263"/>
           </a:xfrm>
           <a:prstGeom prst="rect">
@@ -17120,6 +17235,38 @@
 </file>
 
 <file path=customXml/item1.xml><?xml version="1.0" encoding="utf-8"?>
+<p:properties xmlns:p="http://schemas.microsoft.com/office/2006/metadata/properties" xmlns:xsi="http://www.w3.org/2001/XMLSchema-instance" xmlns:pc="http://schemas.microsoft.com/office/infopath/2007/PartnerControls">
+  <documentManagement>
+    <Large xmlns="6dd88d8b-f5f3-4047-816b-1b197e9e7887">R</Large>
+    <ByPhase xmlns="6dd88d8b-f5f3-4047-816b-1b197e9e7887">.  Prioritization</ByPhase>
+    <Small xmlns="6dd88d8b-f5f3-4047-816b-1b197e9e7887">O</Small>
+    <Deliverable_x0020_or_x0020_Tool xmlns="6dd88d8b-f5f3-4047-816b-1b197e9e7887">Deliverable</Deliverable_x0020_or_x0020_Tool>
+    <Purpose xmlns="6dd88d8b-f5f3-4047-816b-1b197e9e7887">Presentation of project readiness to begin; communicate risk levels; initiate financial and schedule management; Required in the Prioritization phase</Purpose>
+    <Archived xmlns="6dd88d8b-f5f3-4047-816b-1b197e9e7887">false</Archived>
+    <Size xmlns="6dd88d8b-f5f3-4047-816b-1b197e9e7887">
+      <Value>Large</Value>
+      <Value>Medium</Value>
+    </Size>
+    <Phase_x0020_or_x0020_Activity xmlns="6dd88d8b-f5f3-4047-816b-1b197e9e7887">Prioritization</Phase_x0020_or_x0020_Activity>
+    <Medium xmlns="6dd88d8b-f5f3-4047-816b-1b197e9e7887">R</Medium>
+  </documentManagement>
+</p:properties>
+</file>
+
+<file path=customXml/item2.xml><?xml version="1.0" encoding="utf-8"?>
+<?mso-contentType ?>
+<FormTemplates xmlns="http://schemas.microsoft.com/sharepoint/v3/contenttype/forms">
+  <Display>DocumentLibraryForm</Display>
+  <Edit>DocumentLibraryForm</Edit>
+  <New>DocumentLibraryForm</New>
+</FormTemplates>
+</file>
+
+<file path=customXml/item3.xml><?xml version="1.0" encoding="utf-8"?>
+<LongProperties xmlns="http://schemas.microsoft.com/office/2006/metadata/longProperties"/>
+</file>
+
+<file path=customXml/item4.xml><?xml version="1.0" encoding="utf-8"?>
 <ct:contentTypeSchema xmlns:ct="http://schemas.microsoft.com/office/2006/metadata/contentType" xmlns:ma="http://schemas.microsoft.com/office/2006/metadata/properties/metaAttributes" ct:_="" ma:_="" ma:contentTypeName="Document" ma:contentTypeID="0x01010097EB0E19481AD740816C510C741B9922" ma:contentTypeVersion="10" ma:contentTypeDescription="Create a new document." ma:contentTypeScope="" ma:versionID="c884e95d772af74ce8f852590f8116c4">
   <xsd:schema xmlns:xsd="http://www.w3.org/2001/XMLSchema" xmlns:p="http://schemas.microsoft.com/office/2006/metadata/properties" xmlns:ns2="6dd88d8b-f5f3-4047-816b-1b197e9e7887" targetNamespace="http://schemas.microsoft.com/office/2006/metadata/properties" ma:root="true" ma:fieldsID="2cfeafb710d96dd6f8df184b002bfc87" ns2:_="">
     <xsd:import namespace="6dd88d8b-f5f3-4047-816b-1b197e9e7887"/>
@@ -17280,39 +17427,39 @@
 </ct:contentTypeSchema>
 </file>
 
-<file path=customXml/item2.xml><?xml version="1.0" encoding="utf-8"?>
-<LongProperties xmlns="http://schemas.microsoft.com/office/2006/metadata/longProperties"/>
+<file path=customXml/itemProps1.xml><?xml version="1.0" encoding="utf-8"?>
+<ds:datastoreItem xmlns:ds="http://schemas.openxmlformats.org/officeDocument/2006/customXml" ds:itemID="{6BB5F666-97BA-4A59-842F-149FA4B73552}">
+  <ds:schemaRefs>
+    <ds:schemaRef ds:uri="http://purl.org/dc/terms/"/>
+    <ds:schemaRef ds:uri="http://purl.org/dc/elements/1.1/"/>
+    <ds:schemaRef ds:uri="6dd88d8b-f5f3-4047-816b-1b197e9e7887"/>
+    <ds:schemaRef ds:uri="http://purl.org/dc/dcmitype/"/>
+    <ds:schemaRef ds:uri="http://schemas.microsoft.com/office/2006/metadata/properties"/>
+    <ds:schemaRef ds:uri="http://schemas.microsoft.com/office/2006/documentManagement/types"/>
+    <ds:schemaRef ds:uri="http://schemas.openxmlformats.org/package/2006/metadata/core-properties"/>
+    <ds:schemaRef ds:uri="http://www.w3.org/XML/1998/namespace"/>
+    <ds:schemaRef ds:uri="http://schemas.microsoft.com/office/infopath/2007/PartnerControls"/>
+  </ds:schemaRefs>
+</ds:datastoreItem>
 </file>
 
-<file path=customXml/item3.xml><?xml version="1.0" encoding="utf-8"?>
-<?mso-contentType ?>
-<FormTemplates xmlns="http://schemas.microsoft.com/sharepoint/v3/contenttype/forms">
-  <Display>DocumentLibraryForm</Display>
-  <Edit>DocumentLibraryForm</Edit>
-  <New>DocumentLibraryForm</New>
-</FormTemplates>
+<file path=customXml/itemProps2.xml><?xml version="1.0" encoding="utf-8"?>
+<ds:datastoreItem xmlns:ds="http://schemas.openxmlformats.org/officeDocument/2006/customXml" ds:itemID="{BEC355A2-6399-43F6-B938-5209FFC25CFA}">
+  <ds:schemaRefs>
+    <ds:schemaRef ds:uri="http://schemas.microsoft.com/sharepoint/v3/contenttype/forms"/>
+  </ds:schemaRefs>
+</ds:datastoreItem>
 </file>
 
-<file path=customXml/item4.xml><?xml version="1.0" encoding="utf-8"?>
-<p:properties xmlns:p="http://schemas.microsoft.com/office/2006/metadata/properties" xmlns:xsi="http://www.w3.org/2001/XMLSchema-instance" xmlns:pc="http://schemas.microsoft.com/office/infopath/2007/PartnerControls">
-  <documentManagement>
-    <Large xmlns="6dd88d8b-f5f3-4047-816b-1b197e9e7887">R</Large>
-    <ByPhase xmlns="6dd88d8b-f5f3-4047-816b-1b197e9e7887">.  Prioritization</ByPhase>
-    <Small xmlns="6dd88d8b-f5f3-4047-816b-1b197e9e7887">O</Small>
-    <Deliverable_x0020_or_x0020_Tool xmlns="6dd88d8b-f5f3-4047-816b-1b197e9e7887">Deliverable</Deliverable_x0020_or_x0020_Tool>
-    <Purpose xmlns="6dd88d8b-f5f3-4047-816b-1b197e9e7887">Presentation of project readiness to begin; communicate risk levels; initiate financial and schedule management; Required in the Prioritization phase</Purpose>
-    <Archived xmlns="6dd88d8b-f5f3-4047-816b-1b197e9e7887">false</Archived>
-    <Size xmlns="6dd88d8b-f5f3-4047-816b-1b197e9e7887">
-      <Value>Large</Value>
-      <Value>Medium</Value>
-    </Size>
-    <Phase_x0020_or_x0020_Activity xmlns="6dd88d8b-f5f3-4047-816b-1b197e9e7887">Prioritization</Phase_x0020_or_x0020_Activity>
-    <Medium xmlns="6dd88d8b-f5f3-4047-816b-1b197e9e7887">R</Medium>
-  </documentManagement>
-</p:properties>
+<file path=customXml/itemProps3.xml><?xml version="1.0" encoding="utf-8"?>
+<ds:datastoreItem xmlns:ds="http://schemas.openxmlformats.org/officeDocument/2006/customXml" ds:itemID="{8398395E-B0E0-46B3-AF87-10B7C4B8EA99}">
+  <ds:schemaRefs>
+    <ds:schemaRef ds:uri="http://schemas.microsoft.com/office/2006/metadata/longProperties"/>
+  </ds:schemaRefs>
+</ds:datastoreItem>
 </file>
 
-<file path=customXml/itemProps1.xml><?xml version="1.0" encoding="utf-8"?>
+<file path=customXml/itemProps4.xml><?xml version="1.0" encoding="utf-8"?>
 <ds:datastoreItem xmlns:ds="http://schemas.openxmlformats.org/officeDocument/2006/customXml" ds:itemID="{E583DE7D-D443-4E62-B6A7-13F614BB23CE}">
   <ds:schemaRefs>
     <ds:schemaRef ds:uri="http://schemas.microsoft.com/office/2006/metadata/contentType"/>
@@ -17327,36 +17474,4 @@
     <ds:schemaRef ds:uri="http://schemas.microsoft.com/office/internal/2005/internalDocumentation"/>
   </ds:schemaRefs>
 </ds:datastoreItem>
-</file>
-
-<file path=customXml/itemProps2.xml><?xml version="1.0" encoding="utf-8"?>
-<ds:datastoreItem xmlns:ds="http://schemas.openxmlformats.org/officeDocument/2006/customXml" ds:itemID="{8398395E-B0E0-46B3-AF87-10B7C4B8EA99}">
-  <ds:schemaRefs>
-    <ds:schemaRef ds:uri="http://schemas.microsoft.com/office/2006/metadata/longProperties"/>
-  </ds:schemaRefs>
-</ds:datastoreItem>
-</file>
-
-<file path=customXml/itemProps3.xml><?xml version="1.0" encoding="utf-8"?>
-<ds:datastoreItem xmlns:ds="http://schemas.openxmlformats.org/officeDocument/2006/customXml" ds:itemID="{BEC355A2-6399-43F6-B938-5209FFC25CFA}">
-  <ds:schemaRefs>
-    <ds:schemaRef ds:uri="http://schemas.microsoft.com/sharepoint/v3/contenttype/forms"/>
-  </ds:schemaRefs>
-</ds:datastoreItem>
-</file>
-
-<file path=customXml/itemProps4.xml><?xml version="1.0" encoding="utf-8"?>
-<ds:datastoreItem xmlns:ds="http://schemas.openxmlformats.org/officeDocument/2006/customXml" ds:itemID="{6BB5F666-97BA-4A59-842F-149FA4B73552}">
-  <ds:schemaRefs>
-    <ds:schemaRef ds:uri="http://purl.org/dc/elements/1.1/"/>
-    <ds:schemaRef ds:uri="http://schemas.microsoft.com/office/2006/metadata/properties"/>
-    <ds:schemaRef ds:uri="6dd88d8b-f5f3-4047-816b-1b197e9e7887"/>
-    <ds:schemaRef ds:uri="http://schemas.microsoft.com/office/2006/documentManagement/types"/>
-    <ds:schemaRef ds:uri="http://purl.org/dc/terms/"/>
-    <ds:schemaRef ds:uri="http://schemas.openxmlformats.org/package/2006/metadata/core-properties"/>
-    <ds:schemaRef ds:uri="http://purl.org/dc/dcmitype/"/>
-    <ds:schemaRef ds:uri="http://www.w3.org/XML/1998/namespace"/>
-    <ds:schemaRef ds:uri="http://schemas.microsoft.com/office/infopath/2007/PartnerControls"/>
-  </ds:schemaRefs>
-</ds:datastoreItem>
 </file>
</xml_diff>